<commit_message>
Add more graphs to presentation
</commit_message>
<xml_diff>
--- a/4. Blitz Presentation.pptx
+++ b/4. Blitz Presentation.pptx
@@ -23,7 +23,7 @@
       <p:bold r:id="rId9"/>
     </p:embeddedFont>
     <p:embeddedFont>
-      <p:font typeface="Nunito" panose="020F0502020204030204" pitchFamily="2" charset="0"/>
+      <p:font typeface="Nunito" pitchFamily="2" charset="0"/>
       <p:regular r:id="rId10"/>
       <p:bold r:id="rId11"/>
       <p:italic r:id="rId12"/>
@@ -852,7 +852,7 @@
         </p:nvSpPr>
         <p:spPr>
           <a:xfrm>
-            <a:off x="381300" y="685800"/>
+            <a:off x="381000" y="685800"/>
             <a:ext cx="6096000" cy="3429000"/>
           </a:xfrm>
           <a:custGeom>
@@ -956,7 +956,7 @@
         </p:nvSpPr>
         <p:spPr>
           <a:xfrm>
-            <a:off x="381300" y="685800"/>
+            <a:off x="381000" y="685800"/>
             <a:ext cx="6096000" cy="3429000"/>
           </a:xfrm>
           <a:custGeom>
@@ -1164,7 +1164,7 @@
         </p:nvSpPr>
         <p:spPr>
           <a:xfrm>
-            <a:off x="381300" y="685800"/>
+            <a:off x="381000" y="685800"/>
             <a:ext cx="6096000" cy="3429000"/>
           </a:xfrm>
           <a:custGeom>
@@ -15273,7 +15273,7 @@
         </p:spPr>
         <p:txBody>
           <a:bodyPr spcFirstLastPara="1" wrap="square" lIns="91425" tIns="91425" rIns="91425" bIns="91425" anchor="t" anchorCtr="0">
-            <a:normAutofit lnSpcReduction="10000"/>
+            <a:normAutofit/>
           </a:bodyPr>
           <a:lstStyle/>
           <a:p>
@@ -15579,7 +15579,7 @@
         </p:spPr>
         <p:txBody>
           <a:bodyPr spcFirstLastPara="1" wrap="square" lIns="91425" tIns="91425" rIns="91425" bIns="91425" anchor="t" anchorCtr="0">
-            <a:normAutofit fontScale="92500" lnSpcReduction="20000"/>
+            <a:normAutofit fontScale="77500" lnSpcReduction="20000"/>
           </a:bodyPr>
           <a:lstStyle/>
           <a:p>
@@ -16035,7 +16035,7 @@
         </p:nvSpPr>
         <p:spPr>
           <a:xfrm>
-            <a:off x="1303800" y="598575"/>
+            <a:off x="1823020" y="136874"/>
             <a:ext cx="7030500" cy="999300"/>
           </a:xfrm>
           <a:prstGeom prst="rect">
@@ -16091,8 +16091,8 @@
         </p:blipFill>
         <p:spPr>
           <a:xfrm>
-            <a:off x="4636650" y="3854775"/>
-            <a:ext cx="4216870" cy="911225"/>
+            <a:off x="5338270" y="1168326"/>
+            <a:ext cx="3028199" cy="654365"/>
           </a:xfrm>
           <a:prstGeom prst="rect">
             <a:avLst/>
@@ -16111,7 +16111,7 @@
         </p:nvSpPr>
         <p:spPr>
           <a:xfrm>
-            <a:off x="6497600" y="1136175"/>
+            <a:off x="7089220" y="634752"/>
             <a:ext cx="1764300" cy="461700"/>
           </a:xfrm>
           <a:prstGeom prst="rect">
@@ -16169,7 +16169,7 @@
         </p:nvSpPr>
         <p:spPr>
           <a:xfrm>
-            <a:off x="139875" y="1136175"/>
+            <a:off x="-676697" y="634752"/>
             <a:ext cx="3539400" cy="461700"/>
           </a:xfrm>
           <a:prstGeom prst="rect">
@@ -16235,8 +16235,8 @@
         </p:blipFill>
         <p:spPr>
           <a:xfrm>
-            <a:off x="139875" y="3854775"/>
-            <a:ext cx="4219396" cy="911225"/>
+            <a:off x="1163002" y="1158846"/>
+            <a:ext cx="3028199" cy="653973"/>
           </a:xfrm>
           <a:prstGeom prst="rect">
             <a:avLst/>
@@ -16262,7 +16262,7 @@
         </p:blipFill>
         <p:spPr>
           <a:xfrm>
-            <a:off x="1076475" y="1674975"/>
+            <a:off x="5430578" y="3201181"/>
             <a:ext cx="2602800" cy="1952100"/>
           </a:xfrm>
           <a:prstGeom prst="rect">
@@ -16290,7 +16290,7 @@
         </p:blipFill>
         <p:spPr>
           <a:xfrm>
-            <a:off x="5731500" y="1674975"/>
+            <a:off x="1325500" y="3125881"/>
             <a:ext cx="2703200" cy="2027400"/>
           </a:xfrm>
           <a:prstGeom prst="rect">
@@ -16300,6 +16300,66 @@
           <a:ln>
             <a:noFill/>
           </a:ln>
+        </p:spPr>
+      </p:pic>
+      <p:pic>
+        <p:nvPicPr>
+          <p:cNvPr id="3" name="Picture 2">
+            <a:extLst>
+              <a:ext uri="{FF2B5EF4-FFF2-40B4-BE49-F238E27FC236}">
+                <a16:creationId xmlns:a16="http://schemas.microsoft.com/office/drawing/2014/main" id="{DB95EC28-80B9-F40B-E820-49DD5331DF3F}"/>
+              </a:ext>
+            </a:extLst>
+          </p:cNvPr>
+          <p:cNvPicPr>
+            <a:picLocks noChangeAspect="1"/>
+          </p:cNvPicPr>
+          <p:nvPr/>
+        </p:nvPicPr>
+        <p:blipFill>
+          <a:blip r:embed="rId7"/>
+          <a:stretch>
+            <a:fillRect/>
+          </a:stretch>
+        </p:blipFill>
+        <p:spPr>
+          <a:xfrm>
+            <a:off x="5272712" y="1837566"/>
+            <a:ext cx="2918532" cy="1297378"/>
+          </a:xfrm>
+          <a:prstGeom prst="rect">
+            <a:avLst/>
+          </a:prstGeom>
+        </p:spPr>
+      </p:pic>
+      <p:pic>
+        <p:nvPicPr>
+          <p:cNvPr id="5" name="Picture 4">
+            <a:extLst>
+              <a:ext uri="{FF2B5EF4-FFF2-40B4-BE49-F238E27FC236}">
+                <a16:creationId xmlns:a16="http://schemas.microsoft.com/office/drawing/2014/main" id="{DC492B85-F636-14E8-EF92-D0EBBCBCDCF9}"/>
+              </a:ext>
+            </a:extLst>
+          </p:cNvPr>
+          <p:cNvPicPr>
+            <a:picLocks noChangeAspect="1"/>
+          </p:cNvPicPr>
+          <p:nvPr/>
+        </p:nvPicPr>
+        <p:blipFill>
+          <a:blip r:embed="rId8"/>
+          <a:stretch>
+            <a:fillRect/>
+          </a:stretch>
+        </p:blipFill>
+        <p:spPr>
+          <a:xfrm>
+            <a:off x="1256511" y="1895104"/>
+            <a:ext cx="2841179" cy="1262993"/>
+          </a:xfrm>
+          <a:prstGeom prst="rect">
+            <a:avLst/>
+          </a:prstGeom>
         </p:spPr>
       </p:pic>
     </p:spTree>
@@ -16348,7 +16408,7 @@
         </p:spPr>
         <p:txBody>
           <a:bodyPr spcFirstLastPara="1" wrap="square" lIns="91425" tIns="91425" rIns="91425" bIns="91425" anchor="t" anchorCtr="0">
-            <a:normAutofit fontScale="90000"/>
+            <a:normAutofit/>
           </a:bodyPr>
           <a:lstStyle/>
           <a:p>

</xml_diff>

<commit_message>
Add prompt to presentation
</commit_message>
<xml_diff>
--- a/4. Blitz Presentation.pptx
+++ b/4. Blitz Presentation.pptx
@@ -15858,8 +15858,8 @@
         </p:blipFill>
         <p:spPr>
           <a:xfrm>
-            <a:off x="491625" y="2411372"/>
-            <a:ext cx="1683458" cy="2282563"/>
+            <a:off x="319745" y="3196328"/>
+            <a:ext cx="1274080" cy="1727497"/>
           </a:xfrm>
           <a:prstGeom prst="rect">
             <a:avLst/>
@@ -15886,8 +15886,8 @@
         </p:blipFill>
         <p:spPr>
           <a:xfrm>
-            <a:off x="2334025" y="2411382"/>
-            <a:ext cx="1683450" cy="2282542"/>
+            <a:off x="2162145" y="3196338"/>
+            <a:ext cx="1274074" cy="1727481"/>
           </a:xfrm>
           <a:prstGeom prst="rect">
             <a:avLst/>
@@ -15906,8 +15906,8 @@
         </p:nvSpPr>
         <p:spPr>
           <a:xfrm>
-            <a:off x="1131750" y="1980275"/>
-            <a:ext cx="403200" cy="431100"/>
+            <a:off x="809700" y="2765231"/>
+            <a:ext cx="305152" cy="621678"/>
           </a:xfrm>
           <a:prstGeom prst="rect">
             <a:avLst/>
@@ -15936,7 +15936,7 @@
               <a:buNone/>
             </a:pPr>
             <a:r>
-              <a:rPr lang="iw" sz="1600">
+              <a:rPr lang="iw" sz="1600" dirty="0">
                 <a:latin typeface="Calibri"/>
                 <a:ea typeface="Calibri"/>
                 <a:cs typeface="Calibri"/>
@@ -15944,7 +15944,7 @@
               </a:rPr>
               <a:t>→ </a:t>
             </a:r>
-            <a:endParaRPr/>
+            <a:endParaRPr dirty="0"/>
           </a:p>
         </p:txBody>
       </p:sp>
@@ -15956,8 +15956,8 @@
         </p:nvSpPr>
         <p:spPr>
           <a:xfrm>
-            <a:off x="2974150" y="1980275"/>
-            <a:ext cx="403200" cy="431100"/>
+            <a:off x="2646606" y="2765231"/>
+            <a:ext cx="305152" cy="621678"/>
           </a:xfrm>
           <a:prstGeom prst="rect">
             <a:avLst/>
@@ -15986,7 +15986,7 @@
               <a:buNone/>
             </a:pPr>
             <a:r>
-              <a:rPr lang="iw" sz="1600">
+              <a:rPr lang="iw" sz="1600" dirty="0">
                 <a:latin typeface="Calibri"/>
                 <a:ea typeface="Calibri"/>
                 <a:cs typeface="Calibri"/>
@@ -15994,10 +15994,43 @@
               </a:rPr>
               <a:t>← </a:t>
             </a:r>
-            <a:endParaRPr/>
+            <a:endParaRPr dirty="0"/>
           </a:p>
         </p:txBody>
       </p:sp>
+      <p:pic>
+        <p:nvPicPr>
+          <p:cNvPr id="2" name="officeArt object">
+            <a:extLst>
+              <a:ext uri="{FF2B5EF4-FFF2-40B4-BE49-F238E27FC236}">
+                <a16:creationId xmlns:a16="http://schemas.microsoft.com/office/drawing/2014/main" id="{67CA3D0C-CC94-A731-8260-827E2FD5594D}"/>
+              </a:ext>
+            </a:extLst>
+          </p:cNvPr>
+          <p:cNvPicPr/>
+          <p:nvPr/>
+        </p:nvPicPr>
+        <p:blipFill>
+          <a:blip r:embed="rId5"/>
+          <a:stretch>
+            <a:fillRect/>
+          </a:stretch>
+        </p:blipFill>
+        <p:spPr>
+          <a:xfrm>
+            <a:off x="1177319" y="242734"/>
+            <a:ext cx="4008524" cy="2566004"/>
+          </a:xfrm>
+          <a:prstGeom prst="rect">
+            <a:avLst/>
+          </a:prstGeom>
+          <a:ln w="12700" cap="flat">
+            <a:noFill/>
+            <a:miter lim="400000"/>
+          </a:ln>
+          <a:effectLst/>
+        </p:spPr>
+      </p:pic>
     </p:spTree>
   </p:cSld>
   <p:clrMapOvr>

</xml_diff>